<commit_message>
update from Github Repository to DT
Cloud to local
</commit_message>
<xml_diff>
--- a/筆記/iOS 筆記_01 Swift 語言17-0306.pptx
+++ b/筆記/iOS 筆記_01 Swift 語言17-0306.pptx
@@ -127,7 +127,7 @@
   </p:defaultTextStyle>
   <p:extLst>
     <p:ext uri="{EFAFB233-063F-42B5-8137-9DF3F51BA10A}">
-      <p15:sldGuideLst xmlns:p15="http://schemas.microsoft.com/office/powerpoint/2012/main" xmlns="">
+      <p15:sldGuideLst xmlns="" xmlns:p15="http://schemas.microsoft.com/office/powerpoint/2012/main">
         <p15:guide id="1" orient="horz" pos="2160">
           <p15:clr>
             <a:srgbClr val="A4A3A4"/>
@@ -226,7 +226,8 @@
           <a:p>
             <a:fld id="{5B01DFFE-E8EE-284C-B7F9-C4120111A53F}" type="datetimeFigureOut">
               <a:rPr kumimoji="1" lang="zh-TW" altLang="en-US" smtClean="0"/>
-              <a:t>17/3/25</a:t>
+              <a:pPr/>
+              <a:t>2017/3/29</a:t>
             </a:fld>
             <a:endParaRPr kumimoji="1" lang="zh-TW" altLang="en-US"/>
           </a:p>
@@ -385,6 +386,7 @@
           <a:p>
             <a:fld id="{670B0180-0A4B-1043-A91C-AC2AB16056E1}" type="slidenum">
               <a:rPr kumimoji="1" lang="zh-TW" altLang="en-US" smtClean="0"/>
+              <a:pPr/>
               <a:t>‹#›</a:t>
             </a:fld>
             <a:endParaRPr kumimoji="1" lang="zh-TW" altLang="en-US"/>
@@ -394,7 +396,7 @@
     </p:spTree>
     <p:extLst>
       <p:ext uri="{BB962C8B-B14F-4D97-AF65-F5344CB8AC3E}">
-        <p14:creationId xmlns:p14="http://schemas.microsoft.com/office/powerpoint/2010/main" val="3009000876"/>
+        <p14:creationId xmlns:p14="http://schemas.microsoft.com/office/powerpoint/2010/main" xmlns="" val="3009000876"/>
       </p:ext>
     </p:extLst>
   </p:cSld>
@@ -675,7 +677,8 @@
           <a:p>
             <a:fld id="{4FD7B7E8-E084-854E-B5A8-6B82748C85D9}" type="datetimeFigureOut">
               <a:rPr kumimoji="1" lang="zh-TW" altLang="en-US" smtClean="0"/>
-              <a:t>17/3/25</a:t>
+              <a:pPr/>
+              <a:t>2017/3/29</a:t>
             </a:fld>
             <a:endParaRPr kumimoji="1" lang="zh-TW" altLang="en-US"/>
           </a:p>
@@ -717,6 +720,7 @@
           <a:p>
             <a:fld id="{926054F5-5ECF-1947-AF61-069BCD82E5AE}" type="slidenum">
               <a:rPr kumimoji="1" lang="zh-TW" altLang="en-US" smtClean="0"/>
+              <a:pPr/>
               <a:t>‹#›</a:t>
             </a:fld>
             <a:endParaRPr kumimoji="1" lang="zh-TW" altLang="en-US"/>
@@ -726,7 +730,7 @@
     </p:spTree>
     <p:extLst>
       <p:ext uri="{BB962C8B-B14F-4D97-AF65-F5344CB8AC3E}">
-        <p14:creationId xmlns:p14="http://schemas.microsoft.com/office/powerpoint/2010/main" val="655955736"/>
+        <p14:creationId xmlns:p14="http://schemas.microsoft.com/office/powerpoint/2010/main" xmlns="" val="655955736"/>
       </p:ext>
     </p:extLst>
   </p:cSld>
@@ -828,7 +832,8 @@
           <a:p>
             <a:fld id="{4FD7B7E8-E084-854E-B5A8-6B82748C85D9}" type="datetimeFigureOut">
               <a:rPr kumimoji="1" lang="zh-TW" altLang="en-US" smtClean="0"/>
-              <a:t>17/3/25</a:t>
+              <a:pPr/>
+              <a:t>2017/3/29</a:t>
             </a:fld>
             <a:endParaRPr kumimoji="1" lang="zh-TW" altLang="en-US"/>
           </a:p>
@@ -870,6 +875,7 @@
           <a:p>
             <a:fld id="{926054F5-5ECF-1947-AF61-069BCD82E5AE}" type="slidenum">
               <a:rPr kumimoji="1" lang="zh-TW" altLang="en-US" smtClean="0"/>
+              <a:pPr/>
               <a:t>‹#›</a:t>
             </a:fld>
             <a:endParaRPr kumimoji="1" lang="zh-TW" altLang="en-US"/>
@@ -879,7 +885,7 @@
     </p:spTree>
     <p:extLst>
       <p:ext uri="{BB962C8B-B14F-4D97-AF65-F5344CB8AC3E}">
-        <p14:creationId xmlns:p14="http://schemas.microsoft.com/office/powerpoint/2010/main" val="2704376061"/>
+        <p14:creationId xmlns:p14="http://schemas.microsoft.com/office/powerpoint/2010/main" xmlns="" val="2704376061"/>
       </p:ext>
     </p:extLst>
   </p:cSld>
@@ -1019,7 +1025,8 @@
           <a:p>
             <a:fld id="{4FD7B7E8-E084-854E-B5A8-6B82748C85D9}" type="datetimeFigureOut">
               <a:rPr kumimoji="1" lang="zh-TW" altLang="en-US" smtClean="0"/>
-              <a:t>17/3/25</a:t>
+              <a:pPr/>
+              <a:t>2017/3/29</a:t>
             </a:fld>
             <a:endParaRPr kumimoji="1" lang="zh-TW" altLang="en-US"/>
           </a:p>
@@ -1097,6 +1104,7 @@
           <a:p>
             <a:fld id="{926054F5-5ECF-1947-AF61-069BCD82E5AE}" type="slidenum">
               <a:rPr kumimoji="1" lang="zh-TW" altLang="en-US" smtClean="0"/>
+              <a:pPr/>
               <a:t>‹#›</a:t>
             </a:fld>
             <a:endParaRPr kumimoji="1" lang="zh-TW" altLang="en-US"/>
@@ -1106,7 +1114,7 @@
     </p:spTree>
     <p:extLst>
       <p:ext uri="{BB962C8B-B14F-4D97-AF65-F5344CB8AC3E}">
-        <p14:creationId xmlns:p14="http://schemas.microsoft.com/office/powerpoint/2010/main" val="682637797"/>
+        <p14:creationId xmlns:p14="http://schemas.microsoft.com/office/powerpoint/2010/main" xmlns="" val="682637797"/>
       </p:ext>
     </p:extLst>
   </p:cSld>
@@ -1465,7 +1473,7 @@
           <a:p>
             <a:r>
               <a:rPr kumimoji="1" lang="en-US" altLang="zh-TW" dirty="0" smtClean="0"/>
-              <a:t>2017.03.17</a:t>
+              <a:t>2017.03.06</a:t>
             </a:r>
             <a:endParaRPr kumimoji="1" lang="zh-TW" altLang="en-US" dirty="0"/>
           </a:p>
@@ -1474,7 +1482,7 @@
     </p:spTree>
     <p:extLst>
       <p:ext uri="{BB962C8B-B14F-4D97-AF65-F5344CB8AC3E}">
-        <p14:creationId xmlns:p14="http://schemas.microsoft.com/office/powerpoint/2010/main" val="2455300061"/>
+        <p14:creationId xmlns:p14="http://schemas.microsoft.com/office/powerpoint/2010/main" xmlns="" val="2455300061"/>
       </p:ext>
     </p:extLst>
   </p:cSld>
@@ -1484,7 +1492,7 @@
   <p:timing>
     <p:tnLst>
       <p:par>
-        <p:cTn xmlns:p14="http://schemas.microsoft.com/office/powerpoint/2010/main" id="1" dur="indefinite" restart="never" nodeType="tmRoot"/>
+        <p:cTn id="1" dur="indefinite" restart="never" nodeType="tmRoot"/>
       </p:par>
     </p:tnLst>
   </p:timing>
@@ -1520,7 +1528,7 @@
           <a:blip r:embed="rId2">
             <a:extLst>
               <a:ext uri="{28A0092B-C50C-407E-A947-70E740481C1C}">
-                <a14:useLocalDpi xmlns:a14="http://schemas.microsoft.com/office/drawing/2010/main" val="0"/>
+                <a14:useLocalDpi xmlns:a14="http://schemas.microsoft.com/office/drawing/2010/main" xmlns="" val="0"/>
               </a:ext>
             </a:extLst>
           </a:blip>
@@ -1550,7 +1558,7 @@
           <a:blip r:embed="rId3">
             <a:extLst>
               <a:ext uri="{28A0092B-C50C-407E-A947-70E740481C1C}">
-                <a14:useLocalDpi xmlns:a14="http://schemas.microsoft.com/office/drawing/2010/main" val="0"/>
+                <a14:useLocalDpi xmlns:a14="http://schemas.microsoft.com/office/drawing/2010/main" xmlns="" val="0"/>
               </a:ext>
             </a:extLst>
           </a:blip>
@@ -2104,7 +2112,7 @@
     </p:spTree>
     <p:extLst>
       <p:ext uri="{BB962C8B-B14F-4D97-AF65-F5344CB8AC3E}">
-        <p14:creationId xmlns:p14="http://schemas.microsoft.com/office/powerpoint/2010/main" val="443426135"/>
+        <p14:creationId xmlns:p14="http://schemas.microsoft.com/office/powerpoint/2010/main" xmlns="" val="443426135"/>
       </p:ext>
     </p:extLst>
   </p:cSld>
@@ -2114,7 +2122,7 @@
   <p:timing>
     <p:tnLst>
       <p:par>
-        <p:cTn xmlns:p14="http://schemas.microsoft.com/office/powerpoint/2010/main" id="1" dur="indefinite" restart="never" nodeType="tmRoot"/>
+        <p:cTn id="1" dur="indefinite" restart="never" nodeType="tmRoot"/>
       </p:par>
     </p:tnLst>
   </p:timing>
@@ -2150,7 +2158,7 @@
           <a:blip r:embed="rId2">
             <a:extLst>
               <a:ext uri="{28A0092B-C50C-407E-A947-70E740481C1C}">
-                <a14:useLocalDpi xmlns:a14="http://schemas.microsoft.com/office/drawing/2010/main" val="0"/>
+                <a14:useLocalDpi xmlns:a14="http://schemas.microsoft.com/office/drawing/2010/main" xmlns="" val="0"/>
               </a:ext>
             </a:extLst>
           </a:blip>
@@ -2180,7 +2188,7 @@
           <a:blip r:embed="rId3">
             <a:extLst>
               <a:ext uri="{28A0092B-C50C-407E-A947-70E740481C1C}">
-                <a14:useLocalDpi xmlns:a14="http://schemas.microsoft.com/office/drawing/2010/main" val="0"/>
+                <a14:useLocalDpi xmlns:a14="http://schemas.microsoft.com/office/drawing/2010/main" xmlns="" val="0"/>
               </a:ext>
             </a:extLst>
           </a:blip>
@@ -2496,7 +2504,7 @@
     </p:spTree>
     <p:extLst>
       <p:ext uri="{BB962C8B-B14F-4D97-AF65-F5344CB8AC3E}">
-        <p14:creationId xmlns:p14="http://schemas.microsoft.com/office/powerpoint/2010/main" val="739354567"/>
+        <p14:creationId xmlns:p14="http://schemas.microsoft.com/office/powerpoint/2010/main" xmlns="" val="739354567"/>
       </p:ext>
     </p:extLst>
   </p:cSld>
@@ -2506,7 +2514,7 @@
   <p:timing>
     <p:tnLst>
       <p:par>
-        <p:cTn xmlns:p14="http://schemas.microsoft.com/office/powerpoint/2010/main" id="1" dur="indefinite" restart="never" nodeType="tmRoot"/>
+        <p:cTn id="1" dur="indefinite" restart="never" nodeType="tmRoot"/>
       </p:par>
     </p:tnLst>
   </p:timing>
@@ -2542,7 +2550,7 @@
           <a:blip r:embed="rId2">
             <a:extLst>
               <a:ext uri="{28A0092B-C50C-407E-A947-70E740481C1C}">
-                <a14:useLocalDpi xmlns:a14="http://schemas.microsoft.com/office/drawing/2010/main" val="0"/>
+                <a14:useLocalDpi xmlns:a14="http://schemas.microsoft.com/office/drawing/2010/main" xmlns="" val="0"/>
               </a:ext>
             </a:extLst>
           </a:blip>
@@ -3147,7 +3155,7 @@
     </p:spTree>
     <p:extLst>
       <p:ext uri="{BB962C8B-B14F-4D97-AF65-F5344CB8AC3E}">
-        <p14:creationId xmlns:p14="http://schemas.microsoft.com/office/powerpoint/2010/main" val="1665603698"/>
+        <p14:creationId xmlns:p14="http://schemas.microsoft.com/office/powerpoint/2010/main" xmlns="" val="1665603698"/>
       </p:ext>
     </p:extLst>
   </p:cSld>
@@ -3157,7 +3165,7 @@
   <p:timing>
     <p:tnLst>
       <p:par>
-        <p:cTn xmlns:p14="http://schemas.microsoft.com/office/powerpoint/2010/main" id="1" dur="indefinite" restart="never" nodeType="tmRoot"/>
+        <p:cTn id="1" dur="indefinite" restart="never" nodeType="tmRoot"/>
       </p:par>
     </p:tnLst>
   </p:timing>
@@ -3321,7 +3329,7 @@
     </p:spTree>
     <p:extLst>
       <p:ext uri="{BB962C8B-B14F-4D97-AF65-F5344CB8AC3E}">
-        <p14:creationId xmlns:p14="http://schemas.microsoft.com/office/powerpoint/2010/main" val="1820013811"/>
+        <p14:creationId xmlns:p14="http://schemas.microsoft.com/office/powerpoint/2010/main" xmlns="" val="1820013811"/>
       </p:ext>
     </p:extLst>
   </p:cSld>
@@ -3331,7 +3339,7 @@
   <p:timing>
     <p:tnLst>
       <p:par>
-        <p:cTn xmlns:p14="http://schemas.microsoft.com/office/powerpoint/2010/main" id="1" dur="indefinite" restart="never" nodeType="tmRoot"/>
+        <p:cTn id="1" dur="indefinite" restart="never" nodeType="tmRoot"/>
       </p:par>
     </p:tnLst>
   </p:timing>
@@ -3398,7 +3406,7 @@
           <a:blip r:embed="rId2">
             <a:extLst>
               <a:ext uri="{28A0092B-C50C-407E-A947-70E740481C1C}">
-                <a14:useLocalDpi xmlns:a14="http://schemas.microsoft.com/office/drawing/2010/main" val="0"/>
+                <a14:useLocalDpi xmlns:a14="http://schemas.microsoft.com/office/drawing/2010/main" xmlns="" val="0"/>
               </a:ext>
             </a:extLst>
           </a:blip>
@@ -4676,7 +4684,7 @@
     </p:spTree>
     <p:extLst>
       <p:ext uri="{BB962C8B-B14F-4D97-AF65-F5344CB8AC3E}">
-        <p14:creationId xmlns:p14="http://schemas.microsoft.com/office/powerpoint/2010/main" val="213797096"/>
+        <p14:creationId xmlns:p14="http://schemas.microsoft.com/office/powerpoint/2010/main" xmlns="" val="213797096"/>
       </p:ext>
     </p:extLst>
   </p:cSld>
@@ -4686,7 +4694,7 @@
   <p:timing>
     <p:tnLst>
       <p:par>
-        <p:cTn xmlns:p14="http://schemas.microsoft.com/office/powerpoint/2010/main" id="1" dur="indefinite" restart="never" nodeType="tmRoot"/>
+        <p:cTn id="1" dur="indefinite" restart="never" nodeType="tmRoot"/>
       </p:par>
     </p:tnLst>
   </p:timing>
@@ -4722,7 +4730,7 @@
           <a:blip r:embed="rId2">
             <a:extLst>
               <a:ext uri="{28A0092B-C50C-407E-A947-70E740481C1C}">
-                <a14:useLocalDpi xmlns:a14="http://schemas.microsoft.com/office/drawing/2010/main" val="0"/>
+                <a14:useLocalDpi xmlns:a14="http://schemas.microsoft.com/office/drawing/2010/main" xmlns="" val="0"/>
               </a:ext>
             </a:extLst>
           </a:blip>
@@ -4752,7 +4760,7 @@
           <a:blip r:embed="rId3">
             <a:extLst>
               <a:ext uri="{28A0092B-C50C-407E-A947-70E740481C1C}">
-                <a14:useLocalDpi xmlns:a14="http://schemas.microsoft.com/office/drawing/2010/main" val="0"/>
+                <a14:useLocalDpi xmlns:a14="http://schemas.microsoft.com/office/drawing/2010/main" xmlns="" val="0"/>
               </a:ext>
             </a:extLst>
           </a:blip>
@@ -5081,7 +5089,7 @@
     </p:spTree>
     <p:extLst>
       <p:ext uri="{BB962C8B-B14F-4D97-AF65-F5344CB8AC3E}">
-        <p14:creationId xmlns:p14="http://schemas.microsoft.com/office/powerpoint/2010/main" val="2513703931"/>
+        <p14:creationId xmlns:p14="http://schemas.microsoft.com/office/powerpoint/2010/main" xmlns="" val="2513703931"/>
       </p:ext>
     </p:extLst>
   </p:cSld>
@@ -5091,7 +5099,7 @@
   <p:timing>
     <p:tnLst>
       <p:par>
-        <p:cTn xmlns:p14="http://schemas.microsoft.com/office/powerpoint/2010/main" id="1" dur="indefinite" restart="never" nodeType="tmRoot"/>
+        <p:cTn id="1" dur="indefinite" restart="never" nodeType="tmRoot"/>
       </p:par>
     </p:tnLst>
   </p:timing>
@@ -5127,7 +5135,7 @@
           <a:blip r:embed="rId2">
             <a:extLst>
               <a:ext uri="{28A0092B-C50C-407E-A947-70E740481C1C}">
-                <a14:useLocalDpi xmlns:a14="http://schemas.microsoft.com/office/drawing/2010/main" val="0"/>
+                <a14:useLocalDpi xmlns:a14="http://schemas.microsoft.com/office/drawing/2010/main" xmlns="" val="0"/>
               </a:ext>
             </a:extLst>
           </a:blip>
@@ -5157,7 +5165,7 @@
           <a:blip r:embed="rId3">
             <a:extLst>
               <a:ext uri="{28A0092B-C50C-407E-A947-70E740481C1C}">
-                <a14:useLocalDpi xmlns:a14="http://schemas.microsoft.com/office/drawing/2010/main" val="0"/>
+                <a14:useLocalDpi xmlns:a14="http://schemas.microsoft.com/office/drawing/2010/main" xmlns="" val="0"/>
               </a:ext>
             </a:extLst>
           </a:blip>
@@ -5697,7 +5705,7 @@
     </p:spTree>
     <p:extLst>
       <p:ext uri="{BB962C8B-B14F-4D97-AF65-F5344CB8AC3E}">
-        <p14:creationId xmlns:p14="http://schemas.microsoft.com/office/powerpoint/2010/main" val="2513703931"/>
+        <p14:creationId xmlns:p14="http://schemas.microsoft.com/office/powerpoint/2010/main" xmlns="" val="2513703931"/>
       </p:ext>
     </p:extLst>
   </p:cSld>
@@ -5707,7 +5715,7 @@
   <p:timing>
     <p:tnLst>
       <p:par>
-        <p:cTn xmlns:p14="http://schemas.microsoft.com/office/powerpoint/2010/main" id="1" dur="indefinite" restart="never" nodeType="tmRoot"/>
+        <p:cTn id="1" dur="indefinite" restart="never" nodeType="tmRoot"/>
       </p:par>
     </p:tnLst>
   </p:timing>
@@ -5881,7 +5889,7 @@
           <a:blip r:embed="rId2">
             <a:extLst>
               <a:ext uri="{28A0092B-C50C-407E-A947-70E740481C1C}">
-                <a14:useLocalDpi xmlns:a14="http://schemas.microsoft.com/office/drawing/2010/main" val="0"/>
+                <a14:useLocalDpi xmlns:a14="http://schemas.microsoft.com/office/drawing/2010/main" xmlns="" val="0"/>
               </a:ext>
             </a:extLst>
           </a:blip>
@@ -5902,7 +5910,7 @@
     </p:spTree>
     <p:extLst>
       <p:ext uri="{BB962C8B-B14F-4D97-AF65-F5344CB8AC3E}">
-        <p14:creationId xmlns:p14="http://schemas.microsoft.com/office/powerpoint/2010/main" val="1004335962"/>
+        <p14:creationId xmlns:p14="http://schemas.microsoft.com/office/powerpoint/2010/main" xmlns="" val="1004335962"/>
       </p:ext>
     </p:extLst>
   </p:cSld>
@@ -5912,7 +5920,7 @@
   <p:timing>
     <p:tnLst>
       <p:par>
-        <p:cTn xmlns:p14="http://schemas.microsoft.com/office/powerpoint/2010/main" id="1" dur="indefinite" restart="never" nodeType="tmRoot"/>
+        <p:cTn id="1" dur="indefinite" restart="never" nodeType="tmRoot"/>
       </p:par>
     </p:tnLst>
   </p:timing>
@@ -6031,7 +6039,7 @@
           <a:blip r:embed="rId2">
             <a:extLst>
               <a:ext uri="{28A0092B-C50C-407E-A947-70E740481C1C}">
-                <a14:useLocalDpi xmlns:a14="http://schemas.microsoft.com/office/drawing/2010/main" val="0"/>
+                <a14:useLocalDpi xmlns:a14="http://schemas.microsoft.com/office/drawing/2010/main" xmlns="" val="0"/>
               </a:ext>
             </a:extLst>
           </a:blip>
@@ -6052,7 +6060,7 @@
     </p:spTree>
     <p:extLst>
       <p:ext uri="{BB962C8B-B14F-4D97-AF65-F5344CB8AC3E}">
-        <p14:creationId xmlns:p14="http://schemas.microsoft.com/office/powerpoint/2010/main" val="1172084646"/>
+        <p14:creationId xmlns:p14="http://schemas.microsoft.com/office/powerpoint/2010/main" xmlns="" val="1172084646"/>
       </p:ext>
     </p:extLst>
   </p:cSld>
@@ -6062,7 +6070,7 @@
   <p:timing>
     <p:tnLst>
       <p:par>
-        <p:cTn xmlns:p14="http://schemas.microsoft.com/office/powerpoint/2010/main" id="1" dur="indefinite" restart="never" nodeType="tmRoot"/>
+        <p:cTn id="1" dur="indefinite" restart="never" nodeType="tmRoot"/>
       </p:par>
     </p:tnLst>
   </p:timing>
@@ -6166,7 +6174,7 @@
           <a:blip r:embed="rId2">
             <a:extLst>
               <a:ext uri="{28A0092B-C50C-407E-A947-70E740481C1C}">
-                <a14:useLocalDpi xmlns:a14="http://schemas.microsoft.com/office/drawing/2010/main" val="0"/>
+                <a14:useLocalDpi xmlns:a14="http://schemas.microsoft.com/office/drawing/2010/main" xmlns="" val="0"/>
               </a:ext>
             </a:extLst>
           </a:blip>
@@ -6187,7 +6195,7 @@
     </p:spTree>
     <p:extLst>
       <p:ext uri="{BB962C8B-B14F-4D97-AF65-F5344CB8AC3E}">
-        <p14:creationId xmlns:p14="http://schemas.microsoft.com/office/powerpoint/2010/main" val="1004335962"/>
+        <p14:creationId xmlns:p14="http://schemas.microsoft.com/office/powerpoint/2010/main" xmlns="" val="1004335962"/>
       </p:ext>
     </p:extLst>
   </p:cSld>
@@ -6197,7 +6205,7 @@
   <p:timing>
     <p:tnLst>
       <p:par>
-        <p:cTn xmlns:p14="http://schemas.microsoft.com/office/powerpoint/2010/main" id="1" dur="indefinite" restart="never" nodeType="tmRoot"/>
+        <p:cTn id="1" dur="indefinite" restart="never" nodeType="tmRoot"/>
       </p:par>
     </p:tnLst>
   </p:timing>
@@ -6407,7 +6415,7 @@
     </p:spTree>
     <p:extLst>
       <p:ext uri="{BB962C8B-B14F-4D97-AF65-F5344CB8AC3E}">
-        <p14:creationId xmlns:p14="http://schemas.microsoft.com/office/powerpoint/2010/main" val="3408929265"/>
+        <p14:creationId xmlns:p14="http://schemas.microsoft.com/office/powerpoint/2010/main" xmlns="" val="3408929265"/>
       </p:ext>
     </p:extLst>
   </p:cSld>
@@ -6417,7 +6425,7 @@
   <p:timing>
     <p:tnLst>
       <p:par>
-        <p:cTn xmlns:p14="http://schemas.microsoft.com/office/powerpoint/2010/main" id="1" dur="indefinite" restart="never" nodeType="tmRoot"/>
+        <p:cTn id="1" dur="indefinite" restart="never" nodeType="tmRoot"/>
       </p:par>
     </p:tnLst>
   </p:timing>
@@ -6738,7 +6746,7 @@
     </p:spTree>
     <p:extLst>
       <p:ext uri="{BB962C8B-B14F-4D97-AF65-F5344CB8AC3E}">
-        <p14:creationId xmlns:p14="http://schemas.microsoft.com/office/powerpoint/2010/main" val="236278353"/>
+        <p14:creationId xmlns:p14="http://schemas.microsoft.com/office/powerpoint/2010/main" xmlns="" val="236278353"/>
       </p:ext>
     </p:extLst>
   </p:cSld>
@@ -6748,7 +6756,7 @@
   <p:timing>
     <p:tnLst>
       <p:par>
-        <p:cTn xmlns:p14="http://schemas.microsoft.com/office/powerpoint/2010/main" id="1" dur="indefinite" restart="never" nodeType="tmRoot"/>
+        <p:cTn id="1" dur="indefinite" restart="never" nodeType="tmRoot"/>
       </p:par>
     </p:tnLst>
   </p:timing>
@@ -6784,7 +6792,7 @@
           <a:blip r:embed="rId2">
             <a:extLst>
               <a:ext uri="{28A0092B-C50C-407E-A947-70E740481C1C}">
-                <a14:useLocalDpi xmlns:a14="http://schemas.microsoft.com/office/drawing/2010/main" val="0"/>
+                <a14:useLocalDpi xmlns:a14="http://schemas.microsoft.com/office/drawing/2010/main" xmlns="" val="0"/>
               </a:ext>
             </a:extLst>
           </a:blip>
@@ -7238,7 +7246,7 @@
     </p:spTree>
     <p:extLst>
       <p:ext uri="{BB962C8B-B14F-4D97-AF65-F5344CB8AC3E}">
-        <p14:creationId xmlns:p14="http://schemas.microsoft.com/office/powerpoint/2010/main" val="1665059274"/>
+        <p14:creationId xmlns:p14="http://schemas.microsoft.com/office/powerpoint/2010/main" xmlns="" val="1665059274"/>
       </p:ext>
     </p:extLst>
   </p:cSld>
@@ -7248,7 +7256,7 @@
   <p:timing>
     <p:tnLst>
       <p:par>
-        <p:cTn xmlns:p14="http://schemas.microsoft.com/office/powerpoint/2010/main" id="1" dur="indefinite" restart="never" nodeType="tmRoot"/>
+        <p:cTn id="1" dur="indefinite" restart="never" nodeType="tmRoot"/>
       </p:par>
     </p:tnLst>
   </p:timing>
@@ -7601,7 +7609,7 @@
     </p:spTree>
     <p:extLst>
       <p:ext uri="{BB962C8B-B14F-4D97-AF65-F5344CB8AC3E}">
-        <p14:creationId xmlns:p14="http://schemas.microsoft.com/office/powerpoint/2010/main" val="2372896746"/>
+        <p14:creationId xmlns:p14="http://schemas.microsoft.com/office/powerpoint/2010/main" xmlns="" val="2372896746"/>
       </p:ext>
     </p:extLst>
   </p:cSld>
@@ -7611,7 +7619,7 @@
   <p:timing>
     <p:tnLst>
       <p:par>
-        <p:cTn xmlns:p14="http://schemas.microsoft.com/office/powerpoint/2010/main" id="1" dur="indefinite" restart="never" nodeType="tmRoot"/>
+        <p:cTn id="1" dur="indefinite" restart="never" nodeType="tmRoot"/>
       </p:par>
     </p:tnLst>
   </p:timing>
@@ -7647,7 +7655,7 @@
           <a:blip r:embed="rId2">
             <a:extLst>
               <a:ext uri="{28A0092B-C50C-407E-A947-70E740481C1C}">
-                <a14:useLocalDpi xmlns:a14="http://schemas.microsoft.com/office/drawing/2010/main" val="0"/>
+                <a14:useLocalDpi xmlns:a14="http://schemas.microsoft.com/office/drawing/2010/main" xmlns="" val="0"/>
               </a:ext>
             </a:extLst>
           </a:blip>
@@ -8092,7 +8100,7 @@
     </p:spTree>
     <p:extLst>
       <p:ext uri="{BB962C8B-B14F-4D97-AF65-F5344CB8AC3E}">
-        <p14:creationId xmlns:p14="http://schemas.microsoft.com/office/powerpoint/2010/main" val="2086633911"/>
+        <p14:creationId xmlns:p14="http://schemas.microsoft.com/office/powerpoint/2010/main" xmlns="" val="2086633911"/>
       </p:ext>
     </p:extLst>
   </p:cSld>
@@ -8102,7 +8110,7 @@
   <p:timing>
     <p:tnLst>
       <p:par>
-        <p:cTn xmlns:p14="http://schemas.microsoft.com/office/powerpoint/2010/main" id="1" dur="indefinite" restart="never" nodeType="tmRoot"/>
+        <p:cTn id="1" dur="indefinite" restart="never" nodeType="tmRoot"/>
       </p:par>
     </p:tnLst>
   </p:timing>
@@ -8173,7 +8181,7 @@
           <a:blip r:embed="rId2">
             <a:extLst>
               <a:ext uri="{28A0092B-C50C-407E-A947-70E740481C1C}">
-                <a14:useLocalDpi xmlns:a14="http://schemas.microsoft.com/office/drawing/2010/main" val="0"/>
+                <a14:useLocalDpi xmlns:a14="http://schemas.microsoft.com/office/drawing/2010/main" xmlns="" val="0"/>
               </a:ext>
             </a:extLst>
           </a:blip>
@@ -8894,7 +8902,7 @@
     </p:spTree>
     <p:extLst>
       <p:ext uri="{BB962C8B-B14F-4D97-AF65-F5344CB8AC3E}">
-        <p14:creationId xmlns:p14="http://schemas.microsoft.com/office/powerpoint/2010/main" val="4078536391"/>
+        <p14:creationId xmlns:p14="http://schemas.microsoft.com/office/powerpoint/2010/main" xmlns="" val="4078536391"/>
       </p:ext>
     </p:extLst>
   </p:cSld>
@@ -8904,7 +8912,7 @@
   <p:timing>
     <p:tnLst>
       <p:par>
-        <p:cTn xmlns:p14="http://schemas.microsoft.com/office/powerpoint/2010/main" id="1" dur="indefinite" restart="never" nodeType="tmRoot"/>
+        <p:cTn id="1" dur="indefinite" restart="never" nodeType="tmRoot"/>
       </p:par>
     </p:tnLst>
   </p:timing>
@@ -8940,7 +8948,7 @@
           <a:blip r:embed="rId2">
             <a:extLst>
               <a:ext uri="{28A0092B-C50C-407E-A947-70E740481C1C}">
-                <a14:useLocalDpi xmlns:a14="http://schemas.microsoft.com/office/drawing/2010/main" val="0"/>
+                <a14:useLocalDpi xmlns:a14="http://schemas.microsoft.com/office/drawing/2010/main" xmlns="" val="0"/>
               </a:ext>
             </a:extLst>
           </a:blip>
@@ -9436,7 +9444,7 @@
     </p:spTree>
     <p:extLst>
       <p:ext uri="{BB962C8B-B14F-4D97-AF65-F5344CB8AC3E}">
-        <p14:creationId xmlns:p14="http://schemas.microsoft.com/office/powerpoint/2010/main" val="982469654"/>
+        <p14:creationId xmlns:p14="http://schemas.microsoft.com/office/powerpoint/2010/main" xmlns="" val="982469654"/>
       </p:ext>
     </p:extLst>
   </p:cSld>
@@ -9446,7 +9454,7 @@
   <p:timing>
     <p:tnLst>
       <p:par>
-        <p:cTn xmlns:p14="http://schemas.microsoft.com/office/powerpoint/2010/main" id="1" dur="indefinite" restart="never" nodeType="tmRoot"/>
+        <p:cTn id="1" dur="indefinite" restart="never" nodeType="tmRoot"/>
       </p:par>
     </p:tnLst>
   </p:timing>
@@ -9765,7 +9773,7 @@
     </p:spTree>
     <p:extLst>
       <p:ext uri="{BB962C8B-B14F-4D97-AF65-F5344CB8AC3E}">
-        <p14:creationId xmlns:p14="http://schemas.microsoft.com/office/powerpoint/2010/main" val="1267370463"/>
+        <p14:creationId xmlns:p14="http://schemas.microsoft.com/office/powerpoint/2010/main" xmlns="" val="1267370463"/>
       </p:ext>
     </p:extLst>
   </p:cSld>
@@ -9775,7 +9783,7 @@
   <p:timing>
     <p:tnLst>
       <p:par>
-        <p:cTn xmlns:p14="http://schemas.microsoft.com/office/powerpoint/2010/main" id="1" dur="indefinite" restart="never" nodeType="tmRoot"/>
+        <p:cTn id="1" dur="indefinite" restart="never" nodeType="tmRoot"/>
       </p:par>
     </p:tnLst>
   </p:timing>

</xml_diff>